<commit_message>
up level abstract font size and create slide data class, change name slide generator, update the tests
</commit_message>
<xml_diff>
--- a/slides.pptx
+++ b/slides.pptx
@@ -3146,7 +3146,7 @@
           <a:lstStyle/>
           <a:p>
             <a:pPr>
-              <a:defRPr b="1"/>
+              <a:defRPr b="1" sz="4200"/>
             </a:pPr>
             <a:r>
               <a:t>1 - Refrão Orante</a:t>
@@ -3170,7 +3170,7 @@
           <a:lstStyle/>
           <a:p>
             <a:pPr algn="ctr">
-              <a:defRPr sz="3600">
+              <a:defRPr sz="4200">
                 <a:solidFill>
                   <a:srgbClr val="000000"/>
                 </a:solidFill>
@@ -3182,7 +3182,7 @@
           </a:p>
           <a:p>
             <a:pPr algn="ctr">
-              <a:defRPr sz="3600">
+              <a:defRPr sz="4200">
                 <a:solidFill>
                   <a:srgbClr val="000000"/>
                 </a:solidFill>
@@ -3228,7 +3228,7 @@
           <a:lstStyle/>
           <a:p>
             <a:pPr>
-              <a:defRPr b="1"/>
+              <a:defRPr b="1" sz="4200"/>
             </a:pPr>
             <a:r>
               <a:t>3 - Ato Penitencial</a:t>
@@ -3252,7 +3252,7 @@
           <a:lstStyle/>
           <a:p>
             <a:pPr algn="ctr">
-              <a:defRPr sz="3600">
+              <a:defRPr sz="4200">
                 <a:solidFill>
                   <a:srgbClr val="000000"/>
                 </a:solidFill>
@@ -3264,7 +3264,7 @@
           </a:p>
           <a:p>
             <a:pPr algn="ctr">
-              <a:defRPr sz="3600">
+              <a:defRPr sz="4200">
                 <a:solidFill>
                   <a:srgbClr val="000000"/>
                 </a:solidFill>
@@ -3276,7 +3276,7 @@
           </a:p>
           <a:p>
             <a:pPr algn="ctr">
-              <a:defRPr sz="3600">
+              <a:defRPr sz="4200">
                 <a:solidFill>
                   <a:srgbClr val="000000"/>
                 </a:solidFill>
@@ -3322,7 +3322,7 @@
           <a:lstStyle/>
           <a:p>
             <a:pPr>
-              <a:defRPr b="1"/>
+              <a:defRPr b="1" sz="4200"/>
             </a:pPr>
             <a:r>
               <a:t>3 - Ato Penitencial</a:t>
@@ -3346,7 +3346,7 @@
           <a:lstStyle/>
           <a:p>
             <a:pPr algn="ctr">
-              <a:defRPr sz="3600">
+              <a:defRPr sz="4200">
                 <a:solidFill>
                   <a:srgbClr val="000000"/>
                 </a:solidFill>
@@ -3358,7 +3358,7 @@
           </a:p>
           <a:p>
             <a:pPr algn="ctr">
-              <a:defRPr sz="3600">
+              <a:defRPr sz="4200">
                 <a:solidFill>
                   <a:srgbClr val="000000"/>
                 </a:solidFill>
@@ -3370,7 +3370,7 @@
           </a:p>
           <a:p>
             <a:pPr algn="ctr">
-              <a:defRPr sz="3600">
+              <a:defRPr sz="4200">
                 <a:solidFill>
                   <a:srgbClr val="000000"/>
                 </a:solidFill>
@@ -3416,7 +3416,7 @@
           <a:lstStyle/>
           <a:p>
             <a:pPr>
-              <a:defRPr b="1"/>
+              <a:defRPr b="1" sz="4200"/>
             </a:pPr>
             <a:r>
               <a:t>3 - Ato Penitencial</a:t>
@@ -3440,7 +3440,7 @@
           <a:lstStyle/>
           <a:p>
             <a:pPr algn="ctr">
-              <a:defRPr sz="3600">
+              <a:defRPr sz="4200">
                 <a:solidFill>
                   <a:srgbClr val="000000"/>
                 </a:solidFill>
@@ -3452,7 +3452,7 @@
           </a:p>
           <a:p>
             <a:pPr algn="ctr">
-              <a:defRPr sz="3600">
+              <a:defRPr sz="4200">
                 <a:solidFill>
                   <a:srgbClr val="000000"/>
                 </a:solidFill>
@@ -3464,7 +3464,7 @@
           </a:p>
           <a:p>
             <a:pPr algn="ctr">
-              <a:defRPr sz="3600">
+              <a:defRPr sz="4200">
                 <a:solidFill>
                   <a:srgbClr val="000000"/>
                 </a:solidFill>
@@ -3510,7 +3510,7 @@
           <a:lstStyle/>
           <a:p>
             <a:pPr>
-              <a:defRPr b="1"/>
+              <a:defRPr b="1" sz="4200"/>
             </a:pPr>
             <a:r>
               <a:t>4 - Hino de Louvor</a:t>
@@ -3534,7 +3534,7 @@
           <a:lstStyle/>
           <a:p>
             <a:pPr algn="ctr">
-              <a:defRPr sz="3600">
+              <a:defRPr sz="4200">
                 <a:solidFill>
                   <a:srgbClr val="000000"/>
                 </a:solidFill>
@@ -3546,7 +3546,7 @@
           </a:p>
           <a:p>
             <a:pPr algn="ctr">
-              <a:defRPr sz="3600">
+              <a:defRPr sz="4200">
                 <a:solidFill>
                   <a:srgbClr val="000000"/>
                 </a:solidFill>
@@ -3558,7 +3558,7 @@
           </a:p>
           <a:p>
             <a:pPr algn="ctr">
-              <a:defRPr sz="3600">
+              <a:defRPr sz="4200">
                 <a:solidFill>
                   <a:srgbClr val="000000"/>
                 </a:solidFill>
@@ -3604,7 +3604,7 @@
           <a:lstStyle/>
           <a:p>
             <a:pPr>
-              <a:defRPr b="1"/>
+              <a:defRPr b="1" sz="4200"/>
             </a:pPr>
             <a:r>
               <a:t>4 - Hino de Louvor</a:t>
@@ -3628,7 +3628,7 @@
           <a:lstStyle/>
           <a:p>
             <a:pPr algn="ctr">
-              <a:defRPr sz="3600">
+              <a:defRPr sz="4200">
                 <a:solidFill>
                   <a:srgbClr val="000000"/>
                 </a:solidFill>
@@ -3640,7 +3640,7 @@
           </a:p>
           <a:p>
             <a:pPr algn="ctr">
-              <a:defRPr sz="3600">
+              <a:defRPr sz="4200">
                 <a:solidFill>
                   <a:srgbClr val="000000"/>
                 </a:solidFill>
@@ -3652,7 +3652,7 @@
           </a:p>
           <a:p>
             <a:pPr algn="ctr">
-              <a:defRPr sz="3600">
+              <a:defRPr sz="4200">
                 <a:solidFill>
                   <a:srgbClr val="000000"/>
                 </a:solidFill>
@@ -3664,7 +3664,7 @@
           </a:p>
           <a:p>
             <a:pPr algn="ctr">
-              <a:defRPr sz="3600">
+              <a:defRPr sz="4200">
                 <a:solidFill>
                   <a:srgbClr val="000000"/>
                 </a:solidFill>
@@ -3676,7 +3676,7 @@
           </a:p>
           <a:p>
             <a:pPr algn="ctr">
-              <a:defRPr sz="3600">
+              <a:defRPr sz="4200">
                 <a:solidFill>
                   <a:srgbClr val="000000"/>
                 </a:solidFill>
@@ -3722,7 +3722,7 @@
           <a:lstStyle/>
           <a:p>
             <a:pPr>
-              <a:defRPr b="1"/>
+              <a:defRPr b="1" sz="4200"/>
             </a:pPr>
             <a:r>
               <a:t>4 - Hino de Louvor</a:t>
@@ -3746,7 +3746,7 @@
           <a:lstStyle/>
           <a:p>
             <a:pPr algn="ctr">
-              <a:defRPr sz="3600">
+              <a:defRPr sz="4200">
                 <a:solidFill>
                   <a:srgbClr val="000000"/>
                 </a:solidFill>
@@ -3758,7 +3758,7 @@
           </a:p>
           <a:p>
             <a:pPr algn="ctr">
-              <a:defRPr sz="3600">
+              <a:defRPr sz="4200">
                 <a:solidFill>
                   <a:srgbClr val="000000"/>
                 </a:solidFill>
@@ -3804,7 +3804,7 @@
           <a:lstStyle/>
           <a:p>
             <a:pPr>
-              <a:defRPr b="1"/>
+              <a:defRPr b="1" sz="4200"/>
             </a:pPr>
             <a:r>
               <a:t>4 - Hino de Louvor</a:t>
@@ -3828,7 +3828,7 @@
           <a:lstStyle/>
           <a:p>
             <a:pPr algn="ctr">
-              <a:defRPr sz="3600">
+              <a:defRPr sz="4200">
                 <a:solidFill>
                   <a:srgbClr val="000000"/>
                 </a:solidFill>
@@ -3840,7 +3840,7 @@
           </a:p>
           <a:p>
             <a:pPr algn="ctr">
-              <a:defRPr sz="3600">
+              <a:defRPr sz="4200">
                 <a:solidFill>
                   <a:srgbClr val="000000"/>
                 </a:solidFill>
@@ -3852,7 +3852,7 @@
           </a:p>
           <a:p>
             <a:pPr algn="ctr">
-              <a:defRPr sz="3600">
+              <a:defRPr sz="4200">
                 <a:solidFill>
                   <a:srgbClr val="000000"/>
                 </a:solidFill>
@@ -3898,7 +3898,7 @@
           <a:lstStyle/>
           <a:p>
             <a:pPr>
-              <a:defRPr b="1"/>
+              <a:defRPr b="1" sz="4200"/>
             </a:pPr>
             <a:r>
               <a:t>4 - Hino de Louvor</a:t>
@@ -3922,7 +3922,7 @@
           <a:lstStyle/>
           <a:p>
             <a:pPr algn="ctr">
-              <a:defRPr sz="3600">
+              <a:defRPr sz="4200">
                 <a:solidFill>
                   <a:srgbClr val="000000"/>
                 </a:solidFill>
@@ -3934,7 +3934,7 @@
           </a:p>
           <a:p>
             <a:pPr algn="ctr">
-              <a:defRPr sz="3600">
+              <a:defRPr sz="4200">
                 <a:solidFill>
                   <a:srgbClr val="000000"/>
                 </a:solidFill>
@@ -3946,7 +3946,7 @@
           </a:p>
           <a:p>
             <a:pPr algn="ctr">
-              <a:defRPr sz="3600">
+              <a:defRPr sz="4200">
                 <a:solidFill>
                   <a:srgbClr val="000000"/>
                 </a:solidFill>
@@ -3958,7 +3958,7 @@
           </a:p>
           <a:p>
             <a:pPr algn="ctr">
-              <a:defRPr sz="3600">
+              <a:defRPr sz="4200">
                 <a:solidFill>
                   <a:srgbClr val="000000"/>
                 </a:solidFill>
@@ -4004,7 +4004,7 @@
           <a:lstStyle/>
           <a:p>
             <a:pPr>
-              <a:defRPr b="1"/>
+              <a:defRPr b="1" sz="4200"/>
             </a:pPr>
             <a:r>
               <a:t>5 - Primeira Leitura</a:t>
@@ -4028,7 +4028,7 @@
           <a:lstStyle/>
           <a:p>
             <a:pPr algn="ctr">
-              <a:defRPr sz="3600">
+              <a:defRPr sz="4200">
                 <a:solidFill>
                   <a:srgbClr val="000000"/>
                 </a:solidFill>
@@ -4040,7 +4040,7 @@
           </a:p>
           <a:p>
             <a:pPr algn="ctr">
-              <a:defRPr sz="3600">
+              <a:defRPr sz="4200">
                 <a:solidFill>
                   <a:srgbClr val="000000"/>
                 </a:solidFill>
@@ -4052,7 +4052,7 @@
           </a:p>
           <a:p>
             <a:pPr algn="ctr">
-              <a:defRPr sz="3600">
+              <a:defRPr sz="4200">
                 <a:solidFill>
                   <a:srgbClr val="000000"/>
                 </a:solidFill>
@@ -4098,7 +4098,7 @@
           <a:lstStyle/>
           <a:p>
             <a:pPr>
-              <a:defRPr b="1"/>
+              <a:defRPr b="1" sz="4200"/>
             </a:pPr>
             <a:r>
               <a:t>6 - Salmo</a:t>
@@ -4122,7 +4122,7 @@
           <a:lstStyle/>
           <a:p>
             <a:pPr algn="ctr">
-              <a:defRPr sz="3600">
+              <a:defRPr sz="4200">
                 <a:solidFill>
                   <a:srgbClr val="000000"/>
                 </a:solidFill>
@@ -4134,7 +4134,7 @@
           </a:p>
           <a:p>
             <a:pPr algn="ctr">
-              <a:defRPr sz="3600">
+              <a:defRPr sz="4200">
                 <a:solidFill>
                   <a:srgbClr val="000000"/>
                 </a:solidFill>
@@ -4180,7 +4180,7 @@
           <a:lstStyle/>
           <a:p>
             <a:pPr>
-              <a:defRPr b="1"/>
+              <a:defRPr b="1" sz="4200"/>
             </a:pPr>
             <a:r>
               <a:t>2 - Canto de Abertura</a:t>
@@ -4204,7 +4204,7 @@
           <a:lstStyle/>
           <a:p>
             <a:pPr algn="ctr">
-              <a:defRPr sz="3600">
+              <a:defRPr sz="4200">
                 <a:solidFill>
                   <a:srgbClr val="000000"/>
                 </a:solidFill>
@@ -4216,7 +4216,7 @@
           </a:p>
           <a:p>
             <a:pPr algn="ctr">
-              <a:defRPr sz="3600">
+              <a:defRPr sz="4200">
                 <a:solidFill>
                   <a:srgbClr val="000000"/>
                 </a:solidFill>
@@ -4228,7 +4228,7 @@
           </a:p>
           <a:p>
             <a:pPr algn="ctr">
-              <a:defRPr sz="3600">
+              <a:defRPr sz="4200">
                 <a:solidFill>
                   <a:srgbClr val="000000"/>
                 </a:solidFill>
@@ -4240,7 +4240,7 @@
           </a:p>
           <a:p>
             <a:pPr algn="ctr">
-              <a:defRPr sz="3600">
+              <a:defRPr sz="4200">
                 <a:solidFill>
                   <a:srgbClr val="000000"/>
                 </a:solidFill>
@@ -4286,7 +4286,7 @@
           <a:lstStyle/>
           <a:p>
             <a:pPr>
-              <a:defRPr b="1"/>
+              <a:defRPr b="1" sz="4200"/>
             </a:pPr>
             <a:r>
               <a:t>6 - Salmo</a:t>
@@ -4310,7 +4310,7 @@
           <a:lstStyle/>
           <a:p>
             <a:pPr algn="ctr">
-              <a:defRPr sz="3600">
+              <a:defRPr sz="4200">
                 <a:solidFill>
                   <a:srgbClr val="000000"/>
                 </a:solidFill>
@@ -4322,7 +4322,7 @@
           </a:p>
           <a:p>
             <a:pPr algn="ctr">
-              <a:defRPr sz="3600">
+              <a:defRPr sz="4200">
                 <a:solidFill>
                   <a:srgbClr val="000000"/>
                 </a:solidFill>
@@ -4334,7 +4334,7 @@
           </a:p>
           <a:p>
             <a:pPr algn="ctr">
-              <a:defRPr sz="3600">
+              <a:defRPr sz="4200">
                 <a:solidFill>
                   <a:srgbClr val="000000"/>
                 </a:solidFill>
@@ -4346,7 +4346,7 @@
           </a:p>
           <a:p>
             <a:pPr algn="ctr">
-              <a:defRPr sz="3600">
+              <a:defRPr sz="4200">
                 <a:solidFill>
                   <a:srgbClr val="000000"/>
                 </a:solidFill>
@@ -4392,7 +4392,7 @@
           <a:lstStyle/>
           <a:p>
             <a:pPr>
-              <a:defRPr b="1"/>
+              <a:defRPr b="1" sz="4200"/>
             </a:pPr>
             <a:r>
               <a:t>6 - Salmo</a:t>
@@ -4416,7 +4416,7 @@
           <a:lstStyle/>
           <a:p>
             <a:pPr algn="ctr">
-              <a:defRPr sz="3600">
+              <a:defRPr sz="4200">
                 <a:solidFill>
                   <a:srgbClr val="000000"/>
                 </a:solidFill>
@@ -4428,7 +4428,7 @@
           </a:p>
           <a:p>
             <a:pPr algn="ctr">
-              <a:defRPr sz="3600">
+              <a:defRPr sz="4200">
                 <a:solidFill>
                   <a:srgbClr val="000000"/>
                 </a:solidFill>
@@ -4474,7 +4474,7 @@
           <a:lstStyle/>
           <a:p>
             <a:pPr>
-              <a:defRPr b="1"/>
+              <a:defRPr b="1" sz="4200"/>
             </a:pPr>
             <a:r>
               <a:t>6 - Salmo</a:t>
@@ -4498,7 +4498,7 @@
           <a:lstStyle/>
           <a:p>
             <a:pPr algn="ctr">
-              <a:defRPr sz="3600">
+              <a:defRPr sz="4200">
                 <a:solidFill>
                   <a:srgbClr val="000000"/>
                 </a:solidFill>
@@ -4510,7 +4510,7 @@
           </a:p>
           <a:p>
             <a:pPr algn="ctr">
-              <a:defRPr sz="3600">
+              <a:defRPr sz="4200">
                 <a:solidFill>
                   <a:srgbClr val="000000"/>
                 </a:solidFill>
@@ -4522,7 +4522,7 @@
           </a:p>
           <a:p>
             <a:pPr algn="ctr">
-              <a:defRPr sz="3600">
+              <a:defRPr sz="4200">
                 <a:solidFill>
                   <a:srgbClr val="000000"/>
                 </a:solidFill>
@@ -4534,7 +4534,7 @@
           </a:p>
           <a:p>
             <a:pPr algn="ctr">
-              <a:defRPr sz="3600">
+              <a:defRPr sz="4200">
                 <a:solidFill>
                   <a:srgbClr val="000000"/>
                 </a:solidFill>
@@ -4580,7 +4580,7 @@
           <a:lstStyle/>
           <a:p>
             <a:pPr>
-              <a:defRPr b="1"/>
+              <a:defRPr b="1" sz="4200"/>
             </a:pPr>
             <a:r>
               <a:t>6 - Salmo</a:t>
@@ -4604,7 +4604,7 @@
           <a:lstStyle/>
           <a:p>
             <a:pPr algn="ctr">
-              <a:defRPr sz="3600">
+              <a:defRPr sz="4200">
                 <a:solidFill>
                   <a:srgbClr val="000000"/>
                 </a:solidFill>
@@ -4616,7 +4616,7 @@
           </a:p>
           <a:p>
             <a:pPr algn="ctr">
-              <a:defRPr sz="3600">
+              <a:defRPr sz="4200">
                 <a:solidFill>
                   <a:srgbClr val="000000"/>
                 </a:solidFill>
@@ -4662,7 +4662,7 @@
           <a:lstStyle/>
           <a:p>
             <a:pPr>
-              <a:defRPr b="1"/>
+              <a:defRPr b="1" sz="4200"/>
             </a:pPr>
             <a:r>
               <a:t>6 - Salmo</a:t>
@@ -4686,7 +4686,7 @@
           <a:lstStyle/>
           <a:p>
             <a:pPr algn="ctr">
-              <a:defRPr sz="3600">
+              <a:defRPr sz="4200">
                 <a:solidFill>
                   <a:srgbClr val="000000"/>
                 </a:solidFill>
@@ -4698,7 +4698,7 @@
           </a:p>
           <a:p>
             <a:pPr algn="ctr">
-              <a:defRPr sz="3600">
+              <a:defRPr sz="4200">
                 <a:solidFill>
                   <a:srgbClr val="000000"/>
                 </a:solidFill>
@@ -4710,7 +4710,7 @@
           </a:p>
           <a:p>
             <a:pPr algn="ctr">
-              <a:defRPr sz="3600">
+              <a:defRPr sz="4200">
                 <a:solidFill>
                   <a:srgbClr val="000000"/>
                 </a:solidFill>
@@ -4722,7 +4722,7 @@
           </a:p>
           <a:p>
             <a:pPr algn="ctr">
-              <a:defRPr sz="3600">
+              <a:defRPr sz="4200">
                 <a:solidFill>
                   <a:srgbClr val="000000"/>
                 </a:solidFill>
@@ -4768,7 +4768,7 @@
           <a:lstStyle/>
           <a:p>
             <a:pPr>
-              <a:defRPr b="1"/>
+              <a:defRPr b="1" sz="4200"/>
             </a:pPr>
             <a:r>
               <a:t>6 - Salmo</a:t>
@@ -4792,7 +4792,7 @@
           <a:lstStyle/>
           <a:p>
             <a:pPr algn="ctr">
-              <a:defRPr sz="3600">
+              <a:defRPr sz="4200">
                 <a:solidFill>
                   <a:srgbClr val="000000"/>
                 </a:solidFill>
@@ -4804,7 +4804,7 @@
           </a:p>
           <a:p>
             <a:pPr algn="ctr">
-              <a:defRPr sz="3600">
+              <a:defRPr sz="4200">
                 <a:solidFill>
                   <a:srgbClr val="000000"/>
                 </a:solidFill>
@@ -4850,7 +4850,7 @@
           <a:lstStyle/>
           <a:p>
             <a:pPr>
-              <a:defRPr b="1"/>
+              <a:defRPr b="1" sz="4200"/>
             </a:pPr>
             <a:r>
               <a:t>7 - Aclamação ao Evangelho</a:t>
@@ -4874,7 +4874,7 @@
           <a:lstStyle/>
           <a:p>
             <a:pPr algn="ctr">
-              <a:defRPr sz="3600">
+              <a:defRPr sz="4200">
                 <a:solidFill>
                   <a:srgbClr val="000000"/>
                 </a:solidFill>
@@ -4886,7 +4886,7 @@
           </a:p>
           <a:p>
             <a:pPr algn="ctr">
-              <a:defRPr sz="3600">
+              <a:defRPr sz="4200">
                 <a:solidFill>
                   <a:srgbClr val="000000"/>
                 </a:solidFill>
@@ -4898,7 +4898,7 @@
           </a:p>
           <a:p>
             <a:pPr algn="ctr">
-              <a:defRPr sz="3600">
+              <a:defRPr sz="4200">
                 <a:solidFill>
                   <a:srgbClr val="000000"/>
                 </a:solidFill>
@@ -4910,7 +4910,7 @@
           </a:p>
           <a:p>
             <a:pPr algn="ctr">
-              <a:defRPr sz="3600">
+              <a:defRPr sz="4200">
                 <a:solidFill>
                   <a:srgbClr val="000000"/>
                 </a:solidFill>
@@ -4922,7 +4922,7 @@
           </a:p>
           <a:p>
             <a:pPr algn="ctr">
-              <a:defRPr sz="3600">
+              <a:defRPr sz="4200">
                 <a:solidFill>
                   <a:srgbClr val="000000"/>
                 </a:solidFill>
@@ -4934,7 +4934,7 @@
           </a:p>
           <a:p>
             <a:pPr algn="ctr">
-              <a:defRPr sz="3600">
+              <a:defRPr sz="4200">
                 <a:solidFill>
                   <a:srgbClr val="000000"/>
                 </a:solidFill>
@@ -4980,7 +4980,7 @@
           <a:lstStyle/>
           <a:p>
             <a:pPr>
-              <a:defRPr b="1"/>
+              <a:defRPr b="1" sz="4200"/>
             </a:pPr>
             <a:r>
               <a:t>7 - Aclamação ao Evangelho</a:t>
@@ -5004,7 +5004,7 @@
           <a:lstStyle/>
           <a:p>
             <a:pPr algn="ctr">
-              <a:defRPr sz="3600">
+              <a:defRPr sz="4200">
                 <a:solidFill>
                   <a:srgbClr val="000000"/>
                 </a:solidFill>
@@ -5016,7 +5016,7 @@
           </a:p>
           <a:p>
             <a:pPr algn="ctr">
-              <a:defRPr sz="3600">
+              <a:defRPr sz="4200">
                 <a:solidFill>
                   <a:srgbClr val="000000"/>
                 </a:solidFill>
@@ -5062,7 +5062,7 @@
           <a:lstStyle/>
           <a:p>
             <a:pPr>
-              <a:defRPr b="1"/>
+              <a:defRPr b="1" sz="4200"/>
             </a:pPr>
             <a:r>
               <a:t>7 - Aclamação ao Evangelho</a:t>
@@ -5086,7 +5086,7 @@
           <a:lstStyle/>
           <a:p>
             <a:pPr algn="ctr">
-              <a:defRPr sz="3600">
+              <a:defRPr sz="4200">
                 <a:solidFill>
                   <a:srgbClr val="000000"/>
                 </a:solidFill>
@@ -5098,7 +5098,7 @@
           </a:p>
           <a:p>
             <a:pPr algn="ctr">
-              <a:defRPr sz="3600">
+              <a:defRPr sz="4200">
                 <a:solidFill>
                   <a:srgbClr val="000000"/>
                 </a:solidFill>
@@ -5110,7 +5110,7 @@
           </a:p>
           <a:p>
             <a:pPr algn="ctr">
-              <a:defRPr sz="3600">
+              <a:defRPr sz="4200">
                 <a:solidFill>
                   <a:srgbClr val="000000"/>
                 </a:solidFill>
@@ -5122,7 +5122,7 @@
           </a:p>
           <a:p>
             <a:pPr algn="ctr">
-              <a:defRPr sz="3600">
+              <a:defRPr sz="4200">
                 <a:solidFill>
                   <a:srgbClr val="000000"/>
                 </a:solidFill>
@@ -5134,7 +5134,7 @@
           </a:p>
           <a:p>
             <a:pPr algn="ctr">
-              <a:defRPr sz="3600">
+              <a:defRPr sz="4200">
                 <a:solidFill>
                   <a:srgbClr val="000000"/>
                 </a:solidFill>
@@ -5146,7 +5146,7 @@
           </a:p>
           <a:p>
             <a:pPr algn="ctr">
-              <a:defRPr sz="3600">
+              <a:defRPr sz="4200">
                 <a:solidFill>
                   <a:srgbClr val="000000"/>
                 </a:solidFill>
@@ -5192,7 +5192,7 @@
           <a:lstStyle/>
           <a:p>
             <a:pPr>
-              <a:defRPr b="1"/>
+              <a:defRPr b="1" sz="4200"/>
             </a:pPr>
             <a:r>
               <a:t>8 - Ofertório</a:t>
@@ -5216,7 +5216,7 @@
           <a:lstStyle/>
           <a:p>
             <a:pPr algn="ctr">
-              <a:defRPr sz="3600">
+              <a:defRPr sz="4200">
                 <a:solidFill>
                   <a:srgbClr val="000000"/>
                 </a:solidFill>
@@ -5228,7 +5228,7 @@
           </a:p>
           <a:p>
             <a:pPr algn="ctr">
-              <a:defRPr sz="3600">
+              <a:defRPr sz="4200">
                 <a:solidFill>
                   <a:srgbClr val="000000"/>
                 </a:solidFill>
@@ -5240,7 +5240,7 @@
           </a:p>
           <a:p>
             <a:pPr algn="ctr">
-              <a:defRPr sz="3600">
+              <a:defRPr sz="4200">
                 <a:solidFill>
                   <a:srgbClr val="000000"/>
                 </a:solidFill>
@@ -5252,7 +5252,7 @@
           </a:p>
           <a:p>
             <a:pPr algn="ctr">
-              <a:defRPr sz="3600">
+              <a:defRPr sz="4200">
                 <a:solidFill>
                   <a:srgbClr val="000000"/>
                 </a:solidFill>
@@ -5264,7 +5264,7 @@
           </a:p>
           <a:p>
             <a:pPr algn="ctr">
-              <a:defRPr sz="3600">
+              <a:defRPr sz="4200">
                 <a:solidFill>
                   <a:srgbClr val="000000"/>
                 </a:solidFill>
@@ -5310,7 +5310,7 @@
           <a:lstStyle/>
           <a:p>
             <a:pPr>
-              <a:defRPr b="1"/>
+              <a:defRPr b="1" sz="4200"/>
             </a:pPr>
             <a:r>
               <a:t>2 - Canto de Abertura</a:t>
@@ -5334,7 +5334,7 @@
           <a:lstStyle/>
           <a:p>
             <a:pPr algn="ctr">
-              <a:defRPr sz="3600">
+              <a:defRPr sz="4200">
                 <a:solidFill>
                   <a:srgbClr val="000000"/>
                 </a:solidFill>
@@ -5346,7 +5346,7 @@
           </a:p>
           <a:p>
             <a:pPr algn="ctr">
-              <a:defRPr sz="3600">
+              <a:defRPr sz="4200">
                 <a:solidFill>
                   <a:srgbClr val="000000"/>
                 </a:solidFill>
@@ -5358,7 +5358,7 @@
           </a:p>
           <a:p>
             <a:pPr algn="ctr">
-              <a:defRPr sz="3600">
+              <a:defRPr sz="4200">
                 <a:solidFill>
                   <a:srgbClr val="000000"/>
                 </a:solidFill>
@@ -5370,7 +5370,7 @@
           </a:p>
           <a:p>
             <a:pPr algn="ctr">
-              <a:defRPr sz="3600">
+              <a:defRPr sz="4200">
                 <a:solidFill>
                   <a:srgbClr val="000000"/>
                 </a:solidFill>
@@ -5382,7 +5382,7 @@
           </a:p>
           <a:p>
             <a:pPr algn="ctr">
-              <a:defRPr sz="3600">
+              <a:defRPr sz="4200">
                 <a:solidFill>
                   <a:srgbClr val="000000"/>
                 </a:solidFill>
@@ -5394,7 +5394,7 @@
           </a:p>
           <a:p>
             <a:pPr algn="ctr">
-              <a:defRPr sz="3600">
+              <a:defRPr sz="4200">
                 <a:solidFill>
                   <a:srgbClr val="000000"/>
                 </a:solidFill>
@@ -5406,7 +5406,7 @@
           </a:p>
           <a:p>
             <a:pPr algn="ctr">
-              <a:defRPr sz="3600">
+              <a:defRPr sz="4200">
                 <a:solidFill>
                   <a:srgbClr val="000000"/>
                 </a:solidFill>
@@ -5452,7 +5452,7 @@
           <a:lstStyle/>
           <a:p>
             <a:pPr>
-              <a:defRPr b="1"/>
+              <a:defRPr b="1" sz="4200"/>
             </a:pPr>
             <a:r>
               <a:t>8 - Ofertório</a:t>
@@ -5476,7 +5476,7 @@
           <a:lstStyle/>
           <a:p>
             <a:pPr algn="ctr">
-              <a:defRPr sz="3600">
+              <a:defRPr sz="4200">
                 <a:solidFill>
                   <a:srgbClr val="000000"/>
                 </a:solidFill>
@@ -5488,7 +5488,7 @@
           </a:p>
           <a:p>
             <a:pPr algn="ctr">
-              <a:defRPr sz="3600">
+              <a:defRPr sz="4200">
                 <a:solidFill>
                   <a:srgbClr val="000000"/>
                 </a:solidFill>
@@ -5500,7 +5500,7 @@
           </a:p>
           <a:p>
             <a:pPr algn="ctr">
-              <a:defRPr sz="3600">
+              <a:defRPr sz="4200">
                 <a:solidFill>
                   <a:srgbClr val="000000"/>
                 </a:solidFill>
@@ -5512,7 +5512,7 @@
           </a:p>
           <a:p>
             <a:pPr algn="ctr">
-              <a:defRPr sz="3600">
+              <a:defRPr sz="4200">
                 <a:solidFill>
                   <a:srgbClr val="000000"/>
                 </a:solidFill>
@@ -5558,7 +5558,7 @@
           <a:lstStyle/>
           <a:p>
             <a:pPr>
-              <a:defRPr b="1"/>
+              <a:defRPr b="1" sz="4200"/>
             </a:pPr>
             <a:r>
               <a:t>8 - Ofertório</a:t>
@@ -5582,7 +5582,7 @@
           <a:lstStyle/>
           <a:p>
             <a:pPr algn="ctr">
-              <a:defRPr sz="3600">
+              <a:defRPr sz="4200">
                 <a:solidFill>
                   <a:srgbClr val="000000"/>
                 </a:solidFill>
@@ -5594,7 +5594,7 @@
           </a:p>
           <a:p>
             <a:pPr algn="ctr">
-              <a:defRPr sz="3600">
+              <a:defRPr sz="4200">
                 <a:solidFill>
                   <a:srgbClr val="000000"/>
                 </a:solidFill>
@@ -5606,7 +5606,7 @@
           </a:p>
           <a:p>
             <a:pPr algn="ctr">
-              <a:defRPr sz="3600">
+              <a:defRPr sz="4200">
                 <a:solidFill>
                   <a:srgbClr val="000000"/>
                 </a:solidFill>
@@ -5618,7 +5618,7 @@
           </a:p>
           <a:p>
             <a:pPr algn="ctr">
-              <a:defRPr sz="3600">
+              <a:defRPr sz="4200">
                 <a:solidFill>
                   <a:srgbClr val="000000"/>
                 </a:solidFill>
@@ -5630,7 +5630,7 @@
           </a:p>
           <a:p>
             <a:pPr algn="ctr">
-              <a:defRPr sz="3600">
+              <a:defRPr sz="4200">
                 <a:solidFill>
                   <a:srgbClr val="000000"/>
                 </a:solidFill>
@@ -5676,7 +5676,7 @@
           <a:lstStyle/>
           <a:p>
             <a:pPr>
-              <a:defRPr b="1"/>
+              <a:defRPr b="1" sz="4200"/>
             </a:pPr>
             <a:r>
               <a:t>8 - Ofertório</a:t>
@@ -5700,7 +5700,7 @@
           <a:lstStyle/>
           <a:p>
             <a:pPr algn="ctr">
-              <a:defRPr sz="3600">
+              <a:defRPr sz="4200">
                 <a:solidFill>
                   <a:srgbClr val="000000"/>
                 </a:solidFill>
@@ -5712,7 +5712,7 @@
           </a:p>
           <a:p>
             <a:pPr algn="ctr">
-              <a:defRPr sz="3600">
+              <a:defRPr sz="4200">
                 <a:solidFill>
                   <a:srgbClr val="000000"/>
                 </a:solidFill>
@@ -5724,7 +5724,7 @@
           </a:p>
           <a:p>
             <a:pPr algn="ctr">
-              <a:defRPr sz="3600">
+              <a:defRPr sz="4200">
                 <a:solidFill>
                   <a:srgbClr val="000000"/>
                 </a:solidFill>
@@ -5736,7 +5736,7 @@
           </a:p>
           <a:p>
             <a:pPr algn="ctr">
-              <a:defRPr sz="3600">
+              <a:defRPr sz="4200">
                 <a:solidFill>
                   <a:srgbClr val="000000"/>
                 </a:solidFill>
@@ -5748,7 +5748,7 @@
           </a:p>
           <a:p>
             <a:pPr algn="ctr">
-              <a:defRPr sz="3600">
+              <a:defRPr sz="4200">
                 <a:solidFill>
                   <a:srgbClr val="000000"/>
                 </a:solidFill>
@@ -5794,7 +5794,7 @@
           <a:lstStyle/>
           <a:p>
             <a:pPr>
-              <a:defRPr b="1"/>
+              <a:defRPr b="1" sz="4200"/>
             </a:pPr>
             <a:r>
               <a:t>9 - Santo</a:t>
@@ -5818,7 +5818,7 @@
           <a:lstStyle/>
           <a:p>
             <a:pPr algn="ctr">
-              <a:defRPr sz="3600">
+              <a:defRPr sz="4200">
                 <a:solidFill>
                   <a:srgbClr val="000000"/>
                 </a:solidFill>
@@ -5864,7 +5864,7 @@
           <a:lstStyle/>
           <a:p>
             <a:pPr>
-              <a:defRPr b="1"/>
+              <a:defRPr b="1" sz="4200"/>
             </a:pPr>
             <a:r>
               <a:t>9 - Santo</a:t>
@@ -5888,7 +5888,7 @@
           <a:lstStyle/>
           <a:p>
             <a:pPr algn="ctr">
-              <a:defRPr sz="3600">
+              <a:defRPr sz="4200">
                 <a:solidFill>
                   <a:srgbClr val="000000"/>
                 </a:solidFill>
@@ -5900,7 +5900,7 @@
           </a:p>
           <a:p>
             <a:pPr algn="ctr">
-              <a:defRPr sz="3600">
+              <a:defRPr sz="4200">
                 <a:solidFill>
                   <a:srgbClr val="000000"/>
                 </a:solidFill>
@@ -5946,7 +5946,7 @@
           <a:lstStyle/>
           <a:p>
             <a:pPr>
-              <a:defRPr b="1"/>
+              <a:defRPr b="1" sz="4200"/>
             </a:pPr>
             <a:r>
               <a:t>9 - Santo</a:t>
@@ -5970,7 +5970,7 @@
           <a:lstStyle/>
           <a:p>
             <a:pPr algn="ctr">
-              <a:defRPr sz="3600">
+              <a:defRPr sz="4200">
                 <a:solidFill>
                   <a:srgbClr val="000000"/>
                 </a:solidFill>
@@ -6016,7 +6016,7 @@
           <a:lstStyle/>
           <a:p>
             <a:pPr>
-              <a:defRPr b="1"/>
+              <a:defRPr b="1" sz="4200"/>
             </a:pPr>
             <a:r>
               <a:t>10 - Cordeiro de Deus</a:t>
@@ -6040,7 +6040,7 @@
           <a:lstStyle/>
           <a:p>
             <a:pPr algn="ctr">
-              <a:defRPr sz="3600">
+              <a:defRPr sz="4200">
                 <a:solidFill>
                   <a:srgbClr val="000000"/>
                 </a:solidFill>
@@ -6052,7 +6052,7 @@
           </a:p>
           <a:p>
             <a:pPr algn="ctr">
-              <a:defRPr sz="3600">
+              <a:defRPr sz="4200">
                 <a:solidFill>
                   <a:srgbClr val="000000"/>
                 </a:solidFill>
@@ -6098,7 +6098,7 @@
           <a:lstStyle/>
           <a:p>
             <a:pPr>
-              <a:defRPr b="1"/>
+              <a:defRPr b="1" sz="4200"/>
             </a:pPr>
             <a:r>
               <a:t>11 - Comunhão</a:t>
@@ -6122,7 +6122,7 @@
           <a:lstStyle/>
           <a:p>
             <a:pPr algn="ctr">
-              <a:defRPr sz="3600">
+              <a:defRPr sz="4200">
                 <a:solidFill>
                   <a:srgbClr val="000000"/>
                 </a:solidFill>
@@ -6134,7 +6134,7 @@
           </a:p>
           <a:p>
             <a:pPr algn="ctr">
-              <a:defRPr sz="3600">
+              <a:defRPr sz="4200">
                 <a:solidFill>
                   <a:srgbClr val="000000"/>
                 </a:solidFill>
@@ -6146,7 +6146,7 @@
           </a:p>
           <a:p>
             <a:pPr algn="ctr">
-              <a:defRPr sz="3600">
+              <a:defRPr sz="4200">
                 <a:solidFill>
                   <a:srgbClr val="000000"/>
                 </a:solidFill>
@@ -6158,7 +6158,7 @@
           </a:p>
           <a:p>
             <a:pPr algn="ctr">
-              <a:defRPr sz="3600">
+              <a:defRPr sz="4200">
                 <a:solidFill>
                   <a:srgbClr val="000000"/>
                 </a:solidFill>
@@ -6204,7 +6204,7 @@
           <a:lstStyle/>
           <a:p>
             <a:pPr>
-              <a:defRPr b="1"/>
+              <a:defRPr b="1" sz="4200"/>
             </a:pPr>
             <a:r>
               <a:t>11 - Comunhão</a:t>
@@ -6228,7 +6228,7 @@
           <a:lstStyle/>
           <a:p>
             <a:pPr algn="ctr">
-              <a:defRPr sz="3600">
+              <a:defRPr sz="4200">
                 <a:solidFill>
                   <a:srgbClr val="000000"/>
                 </a:solidFill>
@@ -6240,7 +6240,7 @@
           </a:p>
           <a:p>
             <a:pPr algn="ctr">
-              <a:defRPr sz="3600">
+              <a:defRPr sz="4200">
                 <a:solidFill>
                   <a:srgbClr val="000000"/>
                 </a:solidFill>
@@ -6252,7 +6252,7 @@
           </a:p>
           <a:p>
             <a:pPr algn="ctr">
-              <a:defRPr sz="3600">
+              <a:defRPr sz="4200">
                 <a:solidFill>
                   <a:srgbClr val="000000"/>
                 </a:solidFill>
@@ -6298,7 +6298,7 @@
           <a:lstStyle/>
           <a:p>
             <a:pPr>
-              <a:defRPr b="1"/>
+              <a:defRPr b="1" sz="4200"/>
             </a:pPr>
             <a:r>
               <a:t>11 - Comunhão</a:t>
@@ -6322,7 +6322,7 @@
           <a:lstStyle/>
           <a:p>
             <a:pPr algn="ctr">
-              <a:defRPr sz="3600">
+              <a:defRPr sz="4200">
                 <a:solidFill>
                   <a:srgbClr val="000000"/>
                 </a:solidFill>
@@ -6334,7 +6334,7 @@
           </a:p>
           <a:p>
             <a:pPr algn="ctr">
-              <a:defRPr sz="3600">
+              <a:defRPr sz="4200">
                 <a:solidFill>
                   <a:srgbClr val="000000"/>
                 </a:solidFill>
@@ -6346,7 +6346,7 @@
           </a:p>
           <a:p>
             <a:pPr algn="ctr">
-              <a:defRPr sz="3600">
+              <a:defRPr sz="4200">
                 <a:solidFill>
                   <a:srgbClr val="000000"/>
                 </a:solidFill>
@@ -6358,7 +6358,7 @@
           </a:p>
           <a:p>
             <a:pPr algn="ctr">
-              <a:defRPr sz="3600">
+              <a:defRPr sz="4200">
                 <a:solidFill>
                   <a:srgbClr val="000000"/>
                 </a:solidFill>
@@ -6404,7 +6404,7 @@
           <a:lstStyle/>
           <a:p>
             <a:pPr>
-              <a:defRPr b="1"/>
+              <a:defRPr b="1" sz="4200"/>
             </a:pPr>
             <a:r>
               <a:t>2 - Canto de Abertura</a:t>
@@ -6428,7 +6428,7 @@
           <a:lstStyle/>
           <a:p>
             <a:pPr algn="ctr">
-              <a:defRPr sz="3600">
+              <a:defRPr sz="4200">
                 <a:solidFill>
                   <a:srgbClr val="000000"/>
                 </a:solidFill>
@@ -6440,7 +6440,7 @@
           </a:p>
           <a:p>
             <a:pPr algn="ctr">
-              <a:defRPr sz="3600">
+              <a:defRPr sz="4200">
                 <a:solidFill>
                   <a:srgbClr val="000000"/>
                 </a:solidFill>
@@ -6452,7 +6452,7 @@
           </a:p>
           <a:p>
             <a:pPr algn="ctr">
-              <a:defRPr sz="3600">
+              <a:defRPr sz="4200">
                 <a:solidFill>
                   <a:srgbClr val="000000"/>
                 </a:solidFill>
@@ -6464,7 +6464,7 @@
           </a:p>
           <a:p>
             <a:pPr algn="ctr">
-              <a:defRPr sz="3600">
+              <a:defRPr sz="4200">
                 <a:solidFill>
                   <a:srgbClr val="000000"/>
                 </a:solidFill>
@@ -6510,7 +6510,7 @@
           <a:lstStyle/>
           <a:p>
             <a:pPr>
-              <a:defRPr b="1"/>
+              <a:defRPr b="1" sz="4200"/>
             </a:pPr>
             <a:r>
               <a:t>11 - Comunhão</a:t>
@@ -6534,7 +6534,7 @@
           <a:lstStyle/>
           <a:p>
             <a:pPr algn="ctr">
-              <a:defRPr sz="3600">
+              <a:defRPr sz="4200">
                 <a:solidFill>
                   <a:srgbClr val="000000"/>
                 </a:solidFill>
@@ -6546,7 +6546,7 @@
           </a:p>
           <a:p>
             <a:pPr algn="ctr">
-              <a:defRPr sz="3600">
+              <a:defRPr sz="4200">
                 <a:solidFill>
                   <a:srgbClr val="000000"/>
                 </a:solidFill>
@@ -6558,7 +6558,7 @@
           </a:p>
           <a:p>
             <a:pPr algn="ctr">
-              <a:defRPr sz="3600">
+              <a:defRPr sz="4200">
                 <a:solidFill>
                   <a:srgbClr val="000000"/>
                 </a:solidFill>
@@ -6604,7 +6604,7 @@
           <a:lstStyle/>
           <a:p>
             <a:pPr>
-              <a:defRPr b="1"/>
+              <a:defRPr b="1" sz="4200"/>
             </a:pPr>
             <a:r>
               <a:t>12 - Final</a:t>
@@ -6628,7 +6628,7 @@
           <a:lstStyle/>
           <a:p>
             <a:pPr algn="ctr">
-              <a:defRPr sz="3600">
+              <a:defRPr sz="4200">
                 <a:solidFill>
                   <a:srgbClr val="000000"/>
                 </a:solidFill>
@@ -6640,7 +6640,7 @@
           </a:p>
           <a:p>
             <a:pPr algn="ctr">
-              <a:defRPr sz="3600">
+              <a:defRPr sz="4200">
                 <a:solidFill>
                   <a:srgbClr val="000000"/>
                 </a:solidFill>
@@ -6686,7 +6686,7 @@
           <a:lstStyle/>
           <a:p>
             <a:pPr>
-              <a:defRPr b="1"/>
+              <a:defRPr b="1" sz="4200"/>
             </a:pPr>
             <a:r>
               <a:t>12 - Final</a:t>
@@ -6710,7 +6710,7 @@
           <a:lstStyle/>
           <a:p>
             <a:pPr algn="ctr">
-              <a:defRPr sz="3600">
+              <a:defRPr sz="4200">
                 <a:solidFill>
                   <a:srgbClr val="000000"/>
                 </a:solidFill>
@@ -6722,7 +6722,7 @@
           </a:p>
           <a:p>
             <a:pPr algn="ctr">
-              <a:defRPr sz="3600">
+              <a:defRPr sz="4200">
                 <a:solidFill>
                   <a:srgbClr val="000000"/>
                 </a:solidFill>
@@ -6768,7 +6768,7 @@
           <a:lstStyle/>
           <a:p>
             <a:pPr>
-              <a:defRPr b="1"/>
+              <a:defRPr b="1" sz="4200"/>
             </a:pPr>
             <a:r>
               <a:t>12 - Final</a:t>
@@ -6792,7 +6792,7 @@
           <a:lstStyle/>
           <a:p>
             <a:pPr algn="ctr">
-              <a:defRPr sz="3600">
+              <a:defRPr sz="4200">
                 <a:solidFill>
                   <a:srgbClr val="000000"/>
                 </a:solidFill>
@@ -6804,7 +6804,7 @@
           </a:p>
           <a:p>
             <a:pPr algn="ctr">
-              <a:defRPr sz="3600">
+              <a:defRPr sz="4200">
                 <a:solidFill>
                   <a:srgbClr val="000000"/>
                 </a:solidFill>
@@ -6850,7 +6850,7 @@
           <a:lstStyle/>
           <a:p>
             <a:pPr>
-              <a:defRPr b="1"/>
+              <a:defRPr b="1" sz="4200"/>
             </a:pPr>
             <a:r>
               <a:t>2 - Canto de Abertura</a:t>
@@ -6874,7 +6874,7 @@
           <a:lstStyle/>
           <a:p>
             <a:pPr algn="ctr">
-              <a:defRPr sz="3600">
+              <a:defRPr sz="4200">
                 <a:solidFill>
                   <a:srgbClr val="000000"/>
                 </a:solidFill>
@@ -6886,7 +6886,7 @@
           </a:p>
           <a:p>
             <a:pPr algn="ctr">
-              <a:defRPr sz="3600">
+              <a:defRPr sz="4200">
                 <a:solidFill>
                   <a:srgbClr val="000000"/>
                 </a:solidFill>
@@ -6898,7 +6898,7 @@
           </a:p>
           <a:p>
             <a:pPr algn="ctr">
-              <a:defRPr sz="3600">
+              <a:defRPr sz="4200">
                 <a:solidFill>
                   <a:srgbClr val="000000"/>
                 </a:solidFill>
@@ -6910,7 +6910,7 @@
           </a:p>
           <a:p>
             <a:pPr algn="ctr">
-              <a:defRPr sz="3600">
+              <a:defRPr sz="4200">
                 <a:solidFill>
                   <a:srgbClr val="000000"/>
                 </a:solidFill>
@@ -6922,7 +6922,7 @@
           </a:p>
           <a:p>
             <a:pPr algn="ctr">
-              <a:defRPr sz="3600">
+              <a:defRPr sz="4200">
                 <a:solidFill>
                   <a:srgbClr val="000000"/>
                 </a:solidFill>
@@ -6934,7 +6934,7 @@
           </a:p>
           <a:p>
             <a:pPr algn="ctr">
-              <a:defRPr sz="3600">
+              <a:defRPr sz="4200">
                 <a:solidFill>
                   <a:srgbClr val="000000"/>
                 </a:solidFill>
@@ -6946,7 +6946,7 @@
           </a:p>
           <a:p>
             <a:pPr algn="ctr">
-              <a:defRPr sz="3600">
+              <a:defRPr sz="4200">
                 <a:solidFill>
                   <a:srgbClr val="000000"/>
                 </a:solidFill>
@@ -6992,7 +6992,7 @@
           <a:lstStyle/>
           <a:p>
             <a:pPr>
-              <a:defRPr b="1"/>
+              <a:defRPr b="1" sz="4200"/>
             </a:pPr>
             <a:r>
               <a:t>2 - Canto de Abertura</a:t>
@@ -7016,7 +7016,7 @@
           <a:lstStyle/>
           <a:p>
             <a:pPr algn="ctr">
-              <a:defRPr sz="3600">
+              <a:defRPr sz="4200">
                 <a:solidFill>
                   <a:srgbClr val="000000"/>
                 </a:solidFill>
@@ -7028,7 +7028,7 @@
           </a:p>
           <a:p>
             <a:pPr algn="ctr">
-              <a:defRPr sz="3600">
+              <a:defRPr sz="4200">
                 <a:solidFill>
                   <a:srgbClr val="000000"/>
                 </a:solidFill>
@@ -7040,7 +7040,7 @@
           </a:p>
           <a:p>
             <a:pPr algn="ctr">
-              <a:defRPr sz="3600">
+              <a:defRPr sz="4200">
                 <a:solidFill>
                   <a:srgbClr val="000000"/>
                 </a:solidFill>
@@ -7052,7 +7052,7 @@
           </a:p>
           <a:p>
             <a:pPr algn="ctr">
-              <a:defRPr sz="3600">
+              <a:defRPr sz="4200">
                 <a:solidFill>
                   <a:srgbClr val="000000"/>
                 </a:solidFill>
@@ -7098,7 +7098,7 @@
           <a:lstStyle/>
           <a:p>
             <a:pPr>
-              <a:defRPr b="1"/>
+              <a:defRPr b="1" sz="4200"/>
             </a:pPr>
             <a:r>
               <a:t>2 - Canto de Abertura</a:t>
@@ -7122,7 +7122,7 @@
           <a:lstStyle/>
           <a:p>
             <a:pPr algn="ctr">
-              <a:defRPr sz="3600">
+              <a:defRPr sz="4200">
                 <a:solidFill>
                   <a:srgbClr val="000000"/>
                 </a:solidFill>
@@ -7134,7 +7134,7 @@
           </a:p>
           <a:p>
             <a:pPr algn="ctr">
-              <a:defRPr sz="3600">
+              <a:defRPr sz="4200">
                 <a:solidFill>
                   <a:srgbClr val="000000"/>
                 </a:solidFill>
@@ -7146,7 +7146,7 @@
           </a:p>
           <a:p>
             <a:pPr algn="ctr">
-              <a:defRPr sz="3600">
+              <a:defRPr sz="4200">
                 <a:solidFill>
                   <a:srgbClr val="000000"/>
                 </a:solidFill>
@@ -7158,7 +7158,7 @@
           </a:p>
           <a:p>
             <a:pPr algn="ctr">
-              <a:defRPr sz="3600">
+              <a:defRPr sz="4200">
                 <a:solidFill>
                   <a:srgbClr val="000000"/>
                 </a:solidFill>
@@ -7204,7 +7204,7 @@
           <a:lstStyle/>
           <a:p>
             <a:pPr>
-              <a:defRPr b="1"/>
+              <a:defRPr b="1" sz="4200"/>
             </a:pPr>
             <a:r>
               <a:t>2 - Canto de Abertura</a:t>
@@ -7228,7 +7228,7 @@
           <a:lstStyle/>
           <a:p>
             <a:pPr algn="ctr">
-              <a:defRPr sz="3600">
+              <a:defRPr sz="4200">
                 <a:solidFill>
                   <a:srgbClr val="000000"/>
                 </a:solidFill>
@@ -7240,7 +7240,7 @@
           </a:p>
           <a:p>
             <a:pPr algn="ctr">
-              <a:defRPr sz="3600">
+              <a:defRPr sz="4200">
                 <a:solidFill>
                   <a:srgbClr val="000000"/>
                 </a:solidFill>
@@ -7252,7 +7252,7 @@
           </a:p>
           <a:p>
             <a:pPr algn="ctr">
-              <a:defRPr sz="3600">
+              <a:defRPr sz="4200">
                 <a:solidFill>
                   <a:srgbClr val="000000"/>
                 </a:solidFill>
@@ -7264,7 +7264,7 @@
           </a:p>
           <a:p>
             <a:pPr algn="ctr">
-              <a:defRPr sz="3600">
+              <a:defRPr sz="4200">
                 <a:solidFill>
                   <a:srgbClr val="000000"/>
                 </a:solidFill>
@@ -7276,7 +7276,7 @@
           </a:p>
           <a:p>
             <a:pPr algn="ctr">
-              <a:defRPr sz="3600">
+              <a:defRPr sz="4200">
                 <a:solidFill>
                   <a:srgbClr val="000000"/>
                 </a:solidFill>
@@ -7288,7 +7288,7 @@
           </a:p>
           <a:p>
             <a:pPr algn="ctr">
-              <a:defRPr sz="3600">
+              <a:defRPr sz="4200">
                 <a:solidFill>
                   <a:srgbClr val="000000"/>
                 </a:solidFill>
@@ -7300,7 +7300,7 @@
           </a:p>
           <a:p>
             <a:pPr algn="ctr">
-              <a:defRPr sz="3600">
+              <a:defRPr sz="4200">
                 <a:solidFill>
                   <a:srgbClr val="000000"/>
                 </a:solidFill>
@@ -7346,7 +7346,7 @@
           <a:lstStyle/>
           <a:p>
             <a:pPr>
-              <a:defRPr b="1"/>
+              <a:defRPr b="1" sz="4200"/>
             </a:pPr>
             <a:r>
               <a:t>2 - Canto de Abertura</a:t>
@@ -7370,7 +7370,7 @@
           <a:lstStyle/>
           <a:p>
             <a:pPr algn="ctr">
-              <a:defRPr sz="3600">
+              <a:defRPr sz="4200">
                 <a:solidFill>
                   <a:srgbClr val="000000"/>
                 </a:solidFill>
@@ -7382,7 +7382,7 @@
           </a:p>
           <a:p>
             <a:pPr algn="ctr">
-              <a:defRPr sz="3600">
+              <a:defRPr sz="4200">
                 <a:solidFill>
                   <a:srgbClr val="000000"/>
                 </a:solidFill>
@@ -7394,7 +7394,7 @@
           </a:p>
           <a:p>
             <a:pPr algn="ctr">
-              <a:defRPr sz="3600">
+              <a:defRPr sz="4200">
                 <a:solidFill>
                   <a:srgbClr val="000000"/>
                 </a:solidFill>
@@ -7406,7 +7406,7 @@
           </a:p>
           <a:p>
             <a:pPr algn="ctr">
-              <a:defRPr sz="3600">
+              <a:defRPr sz="4200">
                 <a:solidFill>
                   <a:srgbClr val="000000"/>
                 </a:solidFill>

</xml_diff>